<commit_message>
finished subject to peer review
</commit_message>
<xml_diff>
--- a/your-project/EC Matermind Preso.pptx
+++ b/your-project/EC Matermind Preso.pptx
@@ -5,7 +5,7 @@
     <p:sldMasterId id="2147483840" r:id="rId1"/>
   </p:sldMasterIdLst>
   <p:notesMasterIdLst>
-    <p:notesMasterId r:id="rId9"/>
+    <p:notesMasterId r:id="rId10"/>
   </p:notesMasterIdLst>
   <p:sldIdLst>
     <p:sldId id="256" r:id="rId2"/>
@@ -14,7 +14,8 @@
     <p:sldId id="259" r:id="rId5"/>
     <p:sldId id="260" r:id="rId6"/>
     <p:sldId id="261" r:id="rId7"/>
-    <p:sldId id="262" r:id="rId8"/>
+    <p:sldId id="263" r:id="rId8"/>
+    <p:sldId id="262" r:id="rId9"/>
   </p:sldIdLst>
   <p:sldSz cx="12192000" cy="6858000"/>
   <p:notesSz cx="6858000" cy="9144000"/>
@@ -113,6 +114,11 @@
       </a:defRPr>
     </a:lvl9pPr>
   </p:defaultTextStyle>
+  <p:extLst>
+    <p:ext uri="{EFAFB233-063F-42B5-8137-9DF3F51BA10A}">
+      <p15:sldGuideLst xmlns:p15="http://schemas.microsoft.com/office/powerpoint/2012/main"/>
+    </p:ext>
+  </p:extLst>
 </p:presentation>
 </file>
 
@@ -198,7 +204,7 @@
           <a:p>
             <a:fld id="{2A6367C1-275B-4001-B049-BD4BE6DFB9A1}" type="datetimeFigureOut">
               <a:rPr lang="en-AU" smtClean="0"/>
-              <a:t>24/10/2019</a:t>
+              <a:t>25/10/2019</a:t>
             </a:fld>
             <a:endParaRPr lang="en-AU"/>
           </a:p>
@@ -590,6 +596,90 @@
 </p:notes>
 </file>
 
+<file path=ppt/notesSlides/notesSlide2.xml><?xml version="1.0" encoding="utf-8"?>
+<p:notes xmlns:a="http://schemas.openxmlformats.org/drawingml/2006/main" xmlns:r="http://schemas.openxmlformats.org/officeDocument/2006/relationships" xmlns:p="http://schemas.openxmlformats.org/presentationml/2006/main">
+  <p:cSld>
+    <p:spTree>
+      <p:nvGrpSpPr>
+        <p:cNvPr id="1" name=""/>
+        <p:cNvGrpSpPr/>
+        <p:nvPr/>
+      </p:nvGrpSpPr>
+      <p:grpSpPr>
+        <a:xfrm>
+          <a:off x="0" y="0"/>
+          <a:ext cx="0" cy="0"/>
+          <a:chOff x="0" y="0"/>
+          <a:chExt cx="0" cy="0"/>
+        </a:xfrm>
+      </p:grpSpPr>
+      <p:sp>
+        <p:nvSpPr>
+          <p:cNvPr id="2" name="Slide Image Placeholder 1"/>
+          <p:cNvSpPr>
+            <a:spLocks noGrp="1" noRot="1" noChangeAspect="1"/>
+          </p:cNvSpPr>
+          <p:nvPr>
+            <p:ph type="sldImg"/>
+          </p:nvPr>
+        </p:nvSpPr>
+        <p:spPr/>
+      </p:sp>
+      <p:sp>
+        <p:nvSpPr>
+          <p:cNvPr id="3" name="Notes Placeholder 2"/>
+          <p:cNvSpPr>
+            <a:spLocks noGrp="1"/>
+          </p:cNvSpPr>
+          <p:nvPr>
+            <p:ph type="body" idx="1"/>
+          </p:nvPr>
+        </p:nvSpPr>
+        <p:spPr/>
+        <p:txBody>
+          <a:bodyPr/>
+          <a:lstStyle/>
+          <a:p>
+            <a:endParaRPr lang="en-AU" dirty="0"/>
+          </a:p>
+        </p:txBody>
+      </p:sp>
+      <p:sp>
+        <p:nvSpPr>
+          <p:cNvPr id="4" name="Slide Number Placeholder 3"/>
+          <p:cNvSpPr>
+            <a:spLocks noGrp="1"/>
+          </p:cNvSpPr>
+          <p:nvPr>
+            <p:ph type="sldNum" sz="quarter" idx="5"/>
+          </p:nvPr>
+        </p:nvSpPr>
+        <p:spPr/>
+        <p:txBody>
+          <a:bodyPr/>
+          <a:lstStyle/>
+          <a:p>
+            <a:fld id="{863F9BD9-C6BC-40B5-821E-FBE65ECE0F28}" type="slidenum">
+              <a:rPr lang="en-AU" smtClean="0"/>
+              <a:t>3</a:t>
+            </a:fld>
+            <a:endParaRPr lang="en-AU"/>
+          </a:p>
+        </p:txBody>
+      </p:sp>
+    </p:spTree>
+    <p:extLst>
+      <p:ext uri="{BB962C8B-B14F-4D97-AF65-F5344CB8AC3E}">
+        <p14:creationId xmlns:p14="http://schemas.microsoft.com/office/powerpoint/2010/main" val="1616390306"/>
+      </p:ext>
+    </p:extLst>
+  </p:cSld>
+  <p:clrMapOvr>
+    <a:masterClrMapping/>
+  </p:clrMapOvr>
+</p:notes>
+</file>
+
 <file path=ppt/slideLayouts/slideLayout1.xml><?xml version="1.0" encoding="utf-8"?>
 <p:sldLayout xmlns:a="http://schemas.openxmlformats.org/drawingml/2006/main" xmlns:r="http://schemas.openxmlformats.org/officeDocument/2006/relationships" xmlns:p="http://schemas.openxmlformats.org/presentationml/2006/main" showMasterSp="0" type="title" preserve="1">
   <p:cSld name="Title Slide">
@@ -815,7 +905,7 @@
             <a:fld id="{5586B75A-687E-405C-8A0B-8D00578BA2C3}" type="datetimeFigureOut">
               <a:rPr lang="en-US" dirty="0"/>
               <a:pPr/>
-              <a:t>10/24/2019</a:t>
+              <a:t>10/25/2019</a:t>
             </a:fld>
             <a:endParaRPr lang="en-US" dirty="0"/>
           </a:p>
@@ -982,7 +1072,7 @@
             <a:fld id="{5586B75A-687E-405C-8A0B-8D00578BA2C3}" type="datetimeFigureOut">
               <a:rPr lang="en-US" dirty="0"/>
               <a:pPr/>
-              <a:t>10/24/2019</a:t>
+              <a:t>10/25/2019</a:t>
             </a:fld>
             <a:endParaRPr lang="en-US" dirty="0"/>
           </a:p>
@@ -1159,7 +1249,7 @@
             <a:fld id="{5586B75A-687E-405C-8A0B-8D00578BA2C3}" type="datetimeFigureOut">
               <a:rPr lang="en-US" dirty="0"/>
               <a:pPr/>
-              <a:t>10/24/2019</a:t>
+              <a:t>10/25/2019</a:t>
             </a:fld>
             <a:endParaRPr lang="en-US" dirty="0"/>
           </a:p>
@@ -1326,7 +1416,7 @@
             <a:fld id="{5586B75A-687E-405C-8A0B-8D00578BA2C3}" type="datetimeFigureOut">
               <a:rPr lang="en-US" dirty="0"/>
               <a:pPr/>
-              <a:t>10/24/2019</a:t>
+              <a:t>10/25/2019</a:t>
             </a:fld>
             <a:endParaRPr lang="en-US" dirty="0"/>
           </a:p>
@@ -1581,7 +1671,7 @@
             <a:fld id="{5586B75A-687E-405C-8A0B-8D00578BA2C3}" type="datetimeFigureOut">
               <a:rPr lang="en-US" dirty="0"/>
               <a:pPr/>
-              <a:t>10/24/2019</a:t>
+              <a:t>10/25/2019</a:t>
             </a:fld>
             <a:endParaRPr lang="en-US" dirty="0"/>
           </a:p>
@@ -1866,7 +1956,7 @@
             <a:fld id="{5586B75A-687E-405C-8A0B-8D00578BA2C3}" type="datetimeFigureOut">
               <a:rPr lang="en-US" dirty="0"/>
               <a:pPr/>
-              <a:t>10/24/2019</a:t>
+              <a:t>10/25/2019</a:t>
             </a:fld>
             <a:endParaRPr lang="en-US" dirty="0"/>
           </a:p>
@@ -2305,7 +2395,7 @@
             <a:fld id="{5586B75A-687E-405C-8A0B-8D00578BA2C3}" type="datetimeFigureOut">
               <a:rPr lang="en-US" dirty="0"/>
               <a:pPr/>
-              <a:t>10/24/2019</a:t>
+              <a:t>10/25/2019</a:t>
             </a:fld>
             <a:endParaRPr lang="en-US" dirty="0"/>
           </a:p>
@@ -2420,7 +2510,7 @@
             <a:fld id="{5586B75A-687E-405C-8A0B-8D00578BA2C3}" type="datetimeFigureOut">
               <a:rPr lang="en-US" dirty="0"/>
               <a:pPr/>
-              <a:t>10/24/2019</a:t>
+              <a:t>10/25/2019</a:t>
             </a:fld>
             <a:endParaRPr lang="en-US" dirty="0"/>
           </a:p>
@@ -2512,7 +2602,7 @@
             <a:fld id="{5586B75A-687E-405C-8A0B-8D00578BA2C3}" type="datetimeFigureOut">
               <a:rPr lang="en-US" dirty="0"/>
               <a:pPr/>
-              <a:t>10/24/2019</a:t>
+              <a:t>10/25/2019</a:t>
             </a:fld>
             <a:endParaRPr lang="en-US" dirty="0"/>
           </a:p>
@@ -2797,7 +2887,7 @@
             <a:fld id="{5586B75A-687E-405C-8A0B-8D00578BA2C3}" type="datetimeFigureOut">
               <a:rPr lang="en-US" dirty="0"/>
               <a:pPr/>
-              <a:t>10/24/2019</a:t>
+              <a:t>10/25/2019</a:t>
             </a:fld>
             <a:endParaRPr lang="en-US" dirty="0"/>
           </a:p>
@@ -3067,7 +3157,7 @@
             <a:fld id="{5586B75A-687E-405C-8A0B-8D00578BA2C3}" type="datetimeFigureOut">
               <a:rPr lang="en-US" dirty="0"/>
               <a:pPr/>
-              <a:t>10/24/2019</a:t>
+              <a:t>10/25/2019</a:t>
             </a:fld>
             <a:endParaRPr lang="en-US" dirty="0"/>
           </a:p>
@@ -3361,7 +3451,7 @@
             <a:fld id="{5586B75A-687E-405C-8A0B-8D00578BA2C3}" type="datetimeFigureOut">
               <a:rPr lang="en-US" dirty="0"/>
               <a:pPr/>
-              <a:t>10/24/2019</a:t>
+              <a:t>10/25/2019</a:t>
             </a:fld>
             <a:endParaRPr lang="en-US" dirty="0"/>
           </a:p>
@@ -3898,7 +3988,7 @@
           <a:p>
             <a:r>
               <a:rPr lang="en-AU" dirty="0"/>
-              <a:t>Elliott</a:t>
+              <a:t>Elliott C</a:t>
             </a:r>
           </a:p>
           <a:p>
@@ -3962,7 +4052,7 @@
           <a:p>
             <a:r>
               <a:rPr lang="en-AU" dirty="0"/>
-              <a:t>Rules</a:t>
+              <a:t>What’s it all about and those all important rules</a:t>
             </a:r>
           </a:p>
         </p:txBody>
@@ -3990,14 +4080,140 @@
           <a:p>
             <a:r>
               <a:rPr lang="en-AU" dirty="0"/>
-              <a:t>About the Game</a:t>
+              <a:t>One player (computer) selects a secret combination of coloured pegs. They can use the same colour more than once</a:t>
             </a:r>
           </a:p>
           <a:p>
             <a:r>
               <a:rPr lang="en-AU" dirty="0"/>
-              <a:t>Logic</a:t>
-            </a:r>
+              <a:t>The second player (user) needs to guess that combination</a:t>
+            </a:r>
+          </a:p>
+          <a:p>
+            <a:r>
+              <a:rPr lang="en-AU" dirty="0"/>
+              <a:t>Feedback is provided after each guess</a:t>
+            </a:r>
+          </a:p>
+          <a:p>
+            <a:pPr marL="686520" lvl="1">
+              <a:spcBef>
+                <a:spcPts val="600"/>
+              </a:spcBef>
+            </a:pPr>
+            <a:r>
+              <a:rPr lang="en-US" dirty="0"/>
+              <a:t>For each </a:t>
+            </a:r>
+            <a:r>
+              <a:rPr lang="en-US" b="1" dirty="0"/>
+              <a:t>correct</a:t>
+            </a:r>
+            <a:r>
+              <a:rPr lang="en-US" dirty="0"/>
+              <a:t> </a:t>
+            </a:r>
+            <a:r>
+              <a:rPr lang="en-US" dirty="0" err="1"/>
+              <a:t>colour</a:t>
+            </a:r>
+            <a:r>
+              <a:rPr lang="en-US" dirty="0"/>
+              <a:t> that appears in the code but </a:t>
+            </a:r>
+            <a:r>
+              <a:rPr lang="en-US" b="1" dirty="0"/>
+              <a:t>incorrect</a:t>
+            </a:r>
+            <a:r>
+              <a:rPr lang="en-US" dirty="0"/>
+              <a:t> position </a:t>
+            </a:r>
+            <a:r>
+              <a:rPr lang="en-US" b="1" dirty="0"/>
+              <a:t>1</a:t>
+            </a:r>
+            <a:r>
+              <a:rPr lang="en-US" dirty="0"/>
+              <a:t> </a:t>
+            </a:r>
+            <a:r>
+              <a:rPr lang="en-US" b="1" dirty="0"/>
+              <a:t>WHITE</a:t>
+            </a:r>
+            <a:r>
+              <a:rPr lang="en-US" dirty="0"/>
+              <a:t> peg awarded</a:t>
+            </a:r>
+          </a:p>
+          <a:p>
+            <a:pPr marL="686520" lvl="1">
+              <a:spcBef>
+                <a:spcPts val="600"/>
+              </a:spcBef>
+            </a:pPr>
+            <a:r>
+              <a:rPr lang="en-US" dirty="0"/>
+              <a:t>For each </a:t>
+            </a:r>
+            <a:r>
+              <a:rPr lang="en-US" b="1" dirty="0"/>
+              <a:t>correct</a:t>
+            </a:r>
+            <a:r>
+              <a:rPr lang="en-US" dirty="0"/>
+              <a:t> </a:t>
+            </a:r>
+            <a:r>
+              <a:rPr lang="en-US" dirty="0" err="1"/>
+              <a:t>colour</a:t>
+            </a:r>
+            <a:r>
+              <a:rPr lang="en-US" dirty="0"/>
+              <a:t> and </a:t>
+            </a:r>
+            <a:r>
+              <a:rPr lang="en-US" b="1" dirty="0"/>
+              <a:t>position</a:t>
+            </a:r>
+            <a:r>
+              <a:rPr lang="en-US" dirty="0"/>
+              <a:t> combination 1 </a:t>
+            </a:r>
+            <a:r>
+              <a:rPr lang="en-US" b="1" dirty="0"/>
+              <a:t>BLACK</a:t>
+            </a:r>
+            <a:r>
+              <a:rPr lang="en-US" dirty="0"/>
+              <a:t> peg awarded</a:t>
+            </a:r>
+          </a:p>
+          <a:p>
+            <a:pPr marL="183600">
+              <a:spcBef>
+                <a:spcPts val="600"/>
+              </a:spcBef>
+            </a:pPr>
+            <a:r>
+              <a:rPr lang="en-US" dirty="0"/>
+              <a:t>The feedback from the prior guess should help inform the next guess</a:t>
+            </a:r>
+          </a:p>
+          <a:p>
+            <a:pPr marL="183600">
+              <a:spcBef>
+                <a:spcPts val="600"/>
+              </a:spcBef>
+            </a:pPr>
+            <a:r>
+              <a:rPr lang="en-US" dirty="0"/>
+              <a:t>Second player only has a fixed number of guesses</a:t>
+            </a:r>
+          </a:p>
+          <a:p>
+            <a:pPr lvl="1"/>
+            <a:endParaRPr lang="en-AU" dirty="0"/>
           </a:p>
         </p:txBody>
       </p:sp>
@@ -4077,18 +4293,213 @@
         </p:nvSpPr>
         <p:spPr/>
         <p:txBody>
-          <a:bodyPr/>
-          <a:lstStyle/>
-          <a:p>
-            <a:r>
-              <a:rPr lang="en-AU" dirty="0"/>
-              <a:t>About the Game</a:t>
-            </a:r>
-          </a:p>
-          <a:p>
-            <a:r>
-              <a:rPr lang="en-AU" dirty="0"/>
-              <a:t>Logic</a:t>
+          <a:bodyPr>
+            <a:normAutofit fontScale="92500" lnSpcReduction="20000"/>
+          </a:bodyPr>
+          <a:lstStyle/>
+          <a:p>
+            <a:pPr marL="183600">
+              <a:spcBef>
+                <a:spcPts val="600"/>
+              </a:spcBef>
+            </a:pPr>
+            <a:r>
+              <a:rPr lang="en-US" dirty="0"/>
+              <a:t>Welcome the player to the game and explain how it works</a:t>
+            </a:r>
+          </a:p>
+          <a:p>
+            <a:pPr marL="183600">
+              <a:spcBef>
+                <a:spcPts val="600"/>
+              </a:spcBef>
+            </a:pPr>
+            <a:endParaRPr lang="en-US" dirty="0"/>
+          </a:p>
+          <a:p>
+            <a:pPr marL="183600">
+              <a:spcBef>
+                <a:spcPts val="600"/>
+              </a:spcBef>
+            </a:pPr>
+            <a:r>
+              <a:rPr lang="en-US" dirty="0"/>
+              <a:t>Computer to generate the ‘code’ of 3 numbers from a choice of 5.</a:t>
+            </a:r>
+          </a:p>
+          <a:p>
+            <a:pPr marL="686520" lvl="1">
+              <a:spcBef>
+                <a:spcPts val="600"/>
+              </a:spcBef>
+            </a:pPr>
+            <a:r>
+              <a:rPr lang="en-US" dirty="0"/>
+              <a:t>Represents 3 </a:t>
+            </a:r>
+            <a:r>
+              <a:rPr lang="en-US" dirty="0" err="1"/>
+              <a:t>colours</a:t>
+            </a:r>
+            <a:r>
+              <a:rPr lang="en-US" dirty="0"/>
+              <a:t> from choice of 5, repeats are allowed</a:t>
+            </a:r>
+          </a:p>
+          <a:p>
+            <a:pPr marL="183600">
+              <a:spcBef>
+                <a:spcPts val="600"/>
+              </a:spcBef>
+            </a:pPr>
+            <a:endParaRPr lang="en-US" dirty="0"/>
+          </a:p>
+          <a:p>
+            <a:pPr marL="183600">
+              <a:spcBef>
+                <a:spcPts val="600"/>
+              </a:spcBef>
+            </a:pPr>
+            <a:r>
+              <a:rPr lang="en-US" dirty="0"/>
+              <a:t>Ask the user to input the </a:t>
+            </a:r>
+            <a:r>
+              <a:rPr lang="en-US" dirty="0" err="1"/>
+              <a:t>colour</a:t>
+            </a:r>
+            <a:r>
+              <a:rPr lang="en-US" dirty="0"/>
+              <a:t> guess of their first position</a:t>
+            </a:r>
+          </a:p>
+          <a:p>
+            <a:pPr marL="578520" lvl="1">
+              <a:spcBef>
+                <a:spcPts val="600"/>
+              </a:spcBef>
+            </a:pPr>
+            <a:r>
+              <a:rPr lang="en-US" dirty="0"/>
+              <a:t>Repeat for 2</a:t>
+            </a:r>
+            <a:r>
+              <a:rPr lang="en-US" baseline="30000" dirty="0"/>
+              <a:t>nd</a:t>
+            </a:r>
+            <a:r>
+              <a:rPr lang="en-US" dirty="0"/>
+              <a:t> and 3</a:t>
+            </a:r>
+            <a:r>
+              <a:rPr lang="en-US" baseline="30000" dirty="0"/>
+              <a:t>rd</a:t>
+            </a:r>
+            <a:r>
+              <a:rPr lang="en-US" dirty="0"/>
+              <a:t> positions</a:t>
+            </a:r>
+          </a:p>
+          <a:p>
+            <a:pPr marL="578520" lvl="1">
+              <a:spcBef>
+                <a:spcPts val="600"/>
+              </a:spcBef>
+            </a:pPr>
+            <a:r>
+              <a:rPr lang="en-US" dirty="0" err="1"/>
+              <a:t>Colours</a:t>
+            </a:r>
+            <a:r>
+              <a:rPr lang="en-US" dirty="0"/>
+              <a:t> translated into numbers</a:t>
+            </a:r>
+          </a:p>
+          <a:p>
+            <a:pPr marL="75600">
+              <a:spcBef>
+                <a:spcPts val="600"/>
+              </a:spcBef>
+            </a:pPr>
+            <a:endParaRPr lang="en-US" dirty="0"/>
+          </a:p>
+          <a:p>
+            <a:pPr marL="183600">
+              <a:spcBef>
+                <a:spcPts val="600"/>
+              </a:spcBef>
+            </a:pPr>
+            <a:r>
+              <a:rPr lang="en-US" dirty="0"/>
+              <a:t>After all guesses inputted, the player’s guess will be compared to the CPU’s code</a:t>
+            </a:r>
+          </a:p>
+          <a:p>
+            <a:pPr marL="75600">
+              <a:spcBef>
+                <a:spcPts val="600"/>
+              </a:spcBef>
+            </a:pPr>
+            <a:endParaRPr lang="en-US" dirty="0"/>
+          </a:p>
+          <a:p>
+            <a:pPr marL="183600">
+              <a:spcBef>
+                <a:spcPts val="600"/>
+              </a:spcBef>
+            </a:pPr>
+            <a:r>
+              <a:rPr lang="en-US" dirty="0"/>
+              <a:t>Assess current guess and provide feedback</a:t>
+            </a:r>
+          </a:p>
+          <a:p>
+            <a:pPr marL="686520" lvl="1">
+              <a:spcBef>
+                <a:spcPts val="600"/>
+              </a:spcBef>
+            </a:pPr>
+            <a:r>
+              <a:rPr lang="en-US" dirty="0"/>
+              <a:t>If the user guess matches computer generated code then we have a winner (and stop game)</a:t>
+            </a:r>
+          </a:p>
+          <a:p>
+            <a:pPr marL="183600">
+              <a:spcBef>
+                <a:spcPts val="600"/>
+              </a:spcBef>
+            </a:pPr>
+            <a:endParaRPr lang="en-US" dirty="0"/>
+          </a:p>
+          <a:p>
+            <a:pPr marL="183600">
+              <a:spcBef>
+                <a:spcPts val="600"/>
+              </a:spcBef>
+            </a:pPr>
+            <a:r>
+              <a:rPr lang="en-US" dirty="0"/>
+              <a:t>If exact </a:t>
+            </a:r>
+            <a:r>
+              <a:rPr lang="en-GB" dirty="0"/>
+              <a:t>match</a:t>
+            </a:r>
+            <a:r>
+              <a:rPr lang="en-US" dirty="0"/>
+              <a:t> not found then user asked to enter their next guess</a:t>
+            </a:r>
+          </a:p>
+          <a:p>
+            <a:pPr marL="686520" lvl="1">
+              <a:spcBef>
+                <a:spcPts val="600"/>
+              </a:spcBef>
+            </a:pPr>
+            <a:r>
+              <a:rPr lang="en-US" dirty="0"/>
+              <a:t>Repeats for 5 rounds</a:t>
             </a:r>
           </a:p>
         </p:txBody>
@@ -4174,14 +4585,42 @@
           <a:p>
             <a:r>
               <a:rPr lang="en-AU" dirty="0"/>
-              <a:t>About the Game</a:t>
+              <a:t>Getting to know the game!</a:t>
             </a:r>
           </a:p>
           <a:p>
             <a:r>
               <a:rPr lang="en-AU" dirty="0"/>
-              <a:t>Logic</a:t>
-            </a:r>
+              <a:t>Branched logic</a:t>
+            </a:r>
+          </a:p>
+          <a:p>
+            <a:pPr lvl="1"/>
+            <a:r>
+              <a:rPr lang="en-AU" dirty="0"/>
+              <a:t>Winner, white peg(s), black peg(s)</a:t>
+            </a:r>
+          </a:p>
+          <a:p>
+            <a:r>
+              <a:rPr lang="en-AU" dirty="0"/>
+              <a:t>Resetting WHITE/ BLACK peg feedback at the beginning of next guess</a:t>
+            </a:r>
+          </a:p>
+          <a:p>
+            <a:r>
+              <a:rPr lang="en-AU" dirty="0"/>
+              <a:t>Too many functions!</a:t>
+            </a:r>
+          </a:p>
+          <a:p>
+            <a:r>
+              <a:rPr lang="en-AU" dirty="0"/>
+              <a:t>Terminating colours</a:t>
+            </a:r>
+          </a:p>
+          <a:p>
+            <a:endParaRPr lang="en-AU" dirty="0"/>
           </a:p>
         </p:txBody>
       </p:sp>
@@ -4266,13 +4705,26 @@
           <a:p>
             <a:r>
               <a:rPr lang="en-AU" dirty="0"/>
-              <a:t>About the Game</a:t>
+              <a:t>“Measure twice, cut once”</a:t>
             </a:r>
           </a:p>
           <a:p>
             <a:r>
               <a:rPr lang="en-AU" dirty="0"/>
-              <a:t>Logic</a:t>
+              <a:t>Spend more time planning</a:t>
+            </a:r>
+          </a:p>
+          <a:p>
+            <a:pPr lvl="1"/>
+            <a:r>
+              <a:rPr lang="en-AU" dirty="0"/>
+              <a:t>Think about the specific functions before coding</a:t>
+            </a:r>
+          </a:p>
+          <a:p>
+            <a:r>
+              <a:rPr lang="en-AU" dirty="0"/>
+              <a:t>Use the new skills learned during the classes</a:t>
             </a:r>
           </a:p>
         </p:txBody>
@@ -4358,13 +4810,44 @@
           <a:p>
             <a:r>
               <a:rPr lang="en-AU" dirty="0"/>
-              <a:t>About the Game</a:t>
+              <a:t>Store functions in UTILS\FUNCS folder</a:t>
             </a:r>
           </a:p>
           <a:p>
             <a:r>
               <a:rPr lang="en-AU" dirty="0"/>
-              <a:t>Logic</a:t>
+              <a:t>Increase the length of the code that needs to be cracked</a:t>
+            </a:r>
+          </a:p>
+          <a:p>
+            <a:r>
+              <a:rPr lang="en-AU" dirty="0"/>
+              <a:t>Allow user to define the length of code</a:t>
+            </a:r>
+          </a:p>
+          <a:p>
+            <a:r>
+              <a:rPr lang="en-AU" dirty="0"/>
+              <a:t>Improve visuals</a:t>
+            </a:r>
+          </a:p>
+          <a:p>
+            <a:pPr lvl="1"/>
+            <a:r>
+              <a:rPr lang="en-AU" dirty="0"/>
+              <a:t>i.e. for WHITE/ BLACK peg feedback</a:t>
+            </a:r>
+          </a:p>
+          <a:p>
+            <a:r>
+              <a:rPr lang="en-AU" dirty="0"/>
+              <a:t>Use more efficient code</a:t>
+            </a:r>
+          </a:p>
+          <a:p>
+            <a:r>
+              <a:rPr lang="en-AU" dirty="0"/>
+              <a:t>Display probability of success before each guess</a:t>
             </a:r>
           </a:p>
         </p:txBody>
@@ -4383,6 +4866,120 @@
 </file>
 
 <file path=ppt/slides/slide7.xml><?xml version="1.0" encoding="utf-8"?>
+<p:sld xmlns:a="http://schemas.openxmlformats.org/drawingml/2006/main" xmlns:r="http://schemas.openxmlformats.org/officeDocument/2006/relationships" xmlns:p="http://schemas.openxmlformats.org/presentationml/2006/main">
+  <p:cSld>
+    <p:spTree>
+      <p:nvGrpSpPr>
+        <p:cNvPr id="1" name=""/>
+        <p:cNvGrpSpPr/>
+        <p:nvPr/>
+      </p:nvGrpSpPr>
+      <p:grpSpPr>
+        <a:xfrm>
+          <a:off x="0" y="0"/>
+          <a:ext cx="0" cy="0"/>
+          <a:chOff x="0" y="0"/>
+          <a:chExt cx="0" cy="0"/>
+        </a:xfrm>
+      </p:grpSpPr>
+      <p:sp>
+        <p:nvSpPr>
+          <p:cNvPr id="2" name="Title 1">
+            <a:extLst>
+              <a:ext uri="{FF2B5EF4-FFF2-40B4-BE49-F238E27FC236}">
+                <a16:creationId xmlns:a16="http://schemas.microsoft.com/office/drawing/2014/main" id="{6A231E98-7148-47F6-B781-64CF08E9D808}"/>
+              </a:ext>
+            </a:extLst>
+          </p:cNvPr>
+          <p:cNvSpPr>
+            <a:spLocks noGrp="1"/>
+          </p:cNvSpPr>
+          <p:nvPr>
+            <p:ph type="title"/>
+          </p:nvPr>
+        </p:nvSpPr>
+        <p:spPr/>
+        <p:txBody>
+          <a:bodyPr/>
+          <a:lstStyle/>
+          <a:p>
+            <a:r>
+              <a:rPr lang="en-AU" dirty="0" err="1"/>
+              <a:t>itertools</a:t>
+            </a:r>
+            <a:endParaRPr lang="en-AU" dirty="0"/>
+          </a:p>
+        </p:txBody>
+      </p:sp>
+      <p:sp>
+        <p:nvSpPr>
+          <p:cNvPr id="3" name="Content Placeholder 2">
+            <a:extLst>
+              <a:ext uri="{FF2B5EF4-FFF2-40B4-BE49-F238E27FC236}">
+                <a16:creationId xmlns:a16="http://schemas.microsoft.com/office/drawing/2014/main" id="{F724BC07-AFFD-4C5A-A5D4-184CEBB31588}"/>
+              </a:ext>
+            </a:extLst>
+          </p:cNvPr>
+          <p:cNvSpPr>
+            <a:spLocks noGrp="1"/>
+          </p:cNvSpPr>
+          <p:nvPr>
+            <p:ph idx="1"/>
+          </p:nvPr>
+        </p:nvSpPr>
+        <p:spPr/>
+        <p:txBody>
+          <a:bodyPr/>
+          <a:lstStyle/>
+          <a:p>
+            <a:endParaRPr lang="en-AU"/>
+          </a:p>
+        </p:txBody>
+      </p:sp>
+      <p:pic>
+        <p:nvPicPr>
+          <p:cNvPr id="4" name="Picture 3">
+            <a:extLst>
+              <a:ext uri="{FF2B5EF4-FFF2-40B4-BE49-F238E27FC236}">
+                <a16:creationId xmlns:a16="http://schemas.microsoft.com/office/drawing/2014/main" id="{4618A4C2-0E95-4CA3-B8EF-69C422C27F5E}"/>
+              </a:ext>
+            </a:extLst>
+          </p:cNvPr>
+          <p:cNvPicPr>
+            <a:picLocks noChangeAspect="1"/>
+          </p:cNvPicPr>
+          <p:nvPr/>
+        </p:nvPicPr>
+        <p:blipFill>
+          <a:blip r:embed="rId2"/>
+          <a:stretch>
+            <a:fillRect/>
+          </a:stretch>
+        </p:blipFill>
+        <p:spPr>
+          <a:xfrm>
+            <a:off x="5450418" y="864108"/>
+            <a:ext cx="4969932" cy="5120754"/>
+          </a:xfrm>
+          <a:prstGeom prst="rect">
+            <a:avLst/>
+          </a:prstGeom>
+        </p:spPr>
+      </p:pic>
+    </p:spTree>
+    <p:extLst>
+      <p:ext uri="{BB962C8B-B14F-4D97-AF65-F5344CB8AC3E}">
+        <p14:creationId xmlns:p14="http://schemas.microsoft.com/office/powerpoint/2010/main" val="1535061344"/>
+      </p:ext>
+    </p:extLst>
+  </p:cSld>
+  <p:clrMapOvr>
+    <a:masterClrMapping/>
+  </p:clrMapOvr>
+</p:sld>
+</file>
+
+<file path=ppt/slides/slide8.xml><?xml version="1.0" encoding="utf-8"?>
 <p:sld xmlns:a="http://schemas.openxmlformats.org/drawingml/2006/main" xmlns:r="http://schemas.openxmlformats.org/officeDocument/2006/relationships" xmlns:p="http://schemas.openxmlformats.org/presentationml/2006/main">
   <p:cSld>
     <p:spTree>

</xml_diff>